<commit_message>
Corrected presentation from CJUG
</commit_message>
<xml_diff>
--- a/Improving Your Agile Process with JBehave.pptx
+++ b/Improving Your Agile Process with JBehave.pptx
@@ -9284,8 +9284,17 @@
             </a:r>
             <a:r>
               <a:rPr lang="en-US" sz="2000" dirty="0"/>
-              <a:t>stupid-simple tool that lets you bind plain-English descriptions of a software component’s behavior to Java. That’s it. </a:t>
-            </a:r>
+              <a:t>stupid-simple tool that lets you bind plain-English descriptions of a software component’s behavior to Java. That’s </a:t>
+            </a:r>
+            <a:r>
+              <a:rPr lang="en-US" sz="2000"/>
+              <a:t>it</a:t>
+            </a:r>
+            <a:r>
+              <a:rPr lang="en-US" sz="2000" smtClean="0"/>
+              <a:t>.</a:t>
+            </a:r>
+            <a:endParaRPr lang="en-US" sz="2000" dirty="0"/>
           </a:p>
           <a:p>
             <a:pPr marL="0" indent="0">

</xml_diff>